<commit_message>
updated this week :)
</commit_message>
<xml_diff>
--- a/Progress/week4/Presentation4.pptx
+++ b/Progress/week4/Presentation4.pptx
@@ -5756,7 +5756,7 @@
               </a:lnSpc>
             </a:pPr>
             <a:r>
-              <a:rPr lang="en-US" sz="4400" b="1" strike="noStrike" spc="-1">
+              <a:rPr lang="en-US" sz="4400" b="1" strike="noStrike" spc="-1" dirty="0">
                 <a:solidFill>
                   <a:srgbClr val="000000"/>
                 </a:solidFill>
@@ -5768,52 +5768,10 @@
                 <a:latin typeface="Times New Roman"/>
                 <a:ea typeface="Times New Roman"/>
               </a:rPr>
-              <a:t>What Each of The Teammate Has Done</a:t>
+              <a:t>What Each of The Teammate Has </a:t>
             </a:r>
-            <a:endParaRPr lang="en-US" sz="1800" b="0" strike="noStrike" spc="-1">
-              <a:solidFill>
-                <a:srgbClr val="000000"/>
-              </a:solidFill>
-              <a:uFill>
-                <a:solidFill>
-                  <a:srgbClr val="FFFFFF"/>
-                </a:solidFill>
-              </a:uFill>
-              <a:latin typeface="Calibri"/>
-            </a:endParaRPr>
-          </a:p>
-        </p:txBody>
-      </p:sp>
-      <p:sp>
-        <p:nvSpPr>
-          <p:cNvPr id="90" name="TextShape 2"/>
-          <p:cNvSpPr txBox="1"/>
-          <p:nvPr/>
-        </p:nvSpPr>
-        <p:spPr>
-          <a:xfrm>
-            <a:off x="838080" y="1825560"/>
-            <a:ext cx="10515240" cy="4350960"/>
-          </a:xfrm>
-          <a:prstGeom prst="rect">
-            <a:avLst/>
-          </a:prstGeom>
-          <a:noFill/>
-          <a:ln>
-            <a:noFill/>
-          </a:ln>
-        </p:spPr>
-        <p:txBody>
-          <a:bodyPr/>
-          <a:lstStyle/>
-          <a:p>
-            <a:pPr>
-              <a:lnSpc>
-                <a:spcPct val="100000"/>
-              </a:lnSpc>
-            </a:pPr>
             <a:r>
-              <a:rPr lang="en-US" sz="5400" b="0" strike="noStrike" spc="-1" dirty="0">
+              <a:rPr lang="en-US" sz="4400" b="1" strike="noStrike" spc="-1" dirty="0" smtClean="0">
                 <a:solidFill>
                   <a:srgbClr val="000000"/>
                 </a:solidFill>
@@ -5825,20 +5783,44 @@
                 <a:latin typeface="Times New Roman"/>
                 <a:ea typeface="Times New Roman"/>
               </a:rPr>
-              <a:t>Alexander Cushing : Styling/Design</a:t>
+              <a:t>Done This Week</a:t>
             </a:r>
-            <a:endParaRPr lang="en-US" sz="2800" b="0" strike="noStrike" spc="-1" dirty="0">
-              <a:solidFill>
-                <a:srgbClr val="000000"/>
-              </a:solidFill>
-              <a:uFill>
-                <a:solidFill>
-                  <a:srgbClr val="FFFFFF"/>
-                </a:solidFill>
-              </a:uFill>
-              <a:latin typeface="Calibri"/>
-            </a:endParaRPr>
-          </a:p>
+            <a:endParaRPr lang="en-US" sz="1800" b="0" strike="noStrike" spc="-1" dirty="0">
+              <a:solidFill>
+                <a:srgbClr val="000000"/>
+              </a:solidFill>
+              <a:uFill>
+                <a:solidFill>
+                  <a:srgbClr val="FFFFFF"/>
+                </a:solidFill>
+              </a:uFill>
+              <a:latin typeface="Calibri"/>
+            </a:endParaRPr>
+          </a:p>
+        </p:txBody>
+      </p:sp>
+      <p:sp>
+        <p:nvSpPr>
+          <p:cNvPr id="90" name="TextShape 2"/>
+          <p:cNvSpPr txBox="1"/>
+          <p:nvPr/>
+        </p:nvSpPr>
+        <p:spPr>
+          <a:xfrm>
+            <a:off x="838080" y="1915832"/>
+            <a:ext cx="10515240" cy="4350960"/>
+          </a:xfrm>
+          <a:prstGeom prst="rect">
+            <a:avLst/>
+          </a:prstGeom>
+          <a:noFill/>
+          <a:ln>
+            <a:noFill/>
+          </a:ln>
+        </p:spPr>
+        <p:txBody>
+          <a:bodyPr/>
+          <a:lstStyle/>
           <a:p>
             <a:pPr>
               <a:lnSpc>
@@ -5846,7 +5828,92 @@
               </a:lnSpc>
             </a:pPr>
             <a:r>
-              <a:rPr lang="en-US" sz="5400" b="0" strike="noStrike" spc="-1" dirty="0">
+              <a:rPr lang="en-US" sz="4400" b="0" strike="noStrike" spc="-1" dirty="0">
+                <a:solidFill>
+                  <a:srgbClr val="000000"/>
+                </a:solidFill>
+                <a:uFill>
+                  <a:solidFill>
+                    <a:srgbClr val="FFFFFF"/>
+                  </a:solidFill>
+                </a:uFill>
+                <a:latin typeface="Times New Roman"/>
+                <a:ea typeface="Times New Roman"/>
+              </a:rPr>
+              <a:t>Alexander Cushing : </a:t>
+            </a:r>
+            <a:r>
+              <a:rPr lang="en-US" sz="4400" b="0" strike="noStrike" spc="-1" dirty="0" smtClean="0">
+                <a:solidFill>
+                  <a:srgbClr val="000000"/>
+                </a:solidFill>
+                <a:uFill>
+                  <a:solidFill>
+                    <a:srgbClr val="FFFFFF"/>
+                  </a:solidFill>
+                </a:uFill>
+                <a:latin typeface="Times New Roman"/>
+                <a:ea typeface="Times New Roman"/>
+              </a:rPr>
+              <a:t>Made </a:t>
+            </a:r>
+            <a:r>
+              <a:rPr lang="en-US" sz="4400" b="0" strike="noStrike" spc="-1" dirty="0" err="1" smtClean="0">
+                <a:solidFill>
+                  <a:srgbClr val="000000"/>
+                </a:solidFill>
+                <a:uFill>
+                  <a:solidFill>
+                    <a:srgbClr val="FFFFFF"/>
+                  </a:solidFill>
+                </a:uFill>
+                <a:latin typeface="Times New Roman"/>
+                <a:ea typeface="Times New Roman"/>
+              </a:rPr>
+              <a:t>Cron</a:t>
+            </a:r>
+            <a:r>
+              <a:rPr lang="en-US" sz="4400" b="0" strike="noStrike" spc="-1" dirty="0" smtClean="0">
+                <a:solidFill>
+                  <a:srgbClr val="000000"/>
+                </a:solidFill>
+                <a:uFill>
+                  <a:solidFill>
+                    <a:srgbClr val="FFFFFF"/>
+                  </a:solidFill>
+                </a:uFill>
+                <a:latin typeface="Times New Roman"/>
+                <a:ea typeface="Times New Roman"/>
+              </a:rPr>
+              <a:t> Job</a:t>
+            </a:r>
+          </a:p>
+          <a:p>
+            <a:pPr>
+              <a:lnSpc>
+                <a:spcPct val="100000"/>
+              </a:lnSpc>
+            </a:pPr>
+            <a:endParaRPr lang="en-US" sz="2000" b="0" strike="noStrike" spc="-1" dirty="0">
+              <a:solidFill>
+                <a:srgbClr val="000000"/>
+              </a:solidFill>
+              <a:uFill>
+                <a:solidFill>
+                  <a:srgbClr val="FFFFFF"/>
+                </a:solidFill>
+              </a:uFill>
+              <a:latin typeface="Calibri"/>
+            </a:endParaRPr>
+          </a:p>
+          <a:p>
+            <a:pPr>
+              <a:lnSpc>
+                <a:spcPct val="100000"/>
+              </a:lnSpc>
+            </a:pPr>
+            <a:r>
+              <a:rPr lang="en-US" sz="4400" b="0" strike="noStrike" spc="-1" dirty="0">
                 <a:solidFill>
                   <a:srgbClr val="000000"/>
                 </a:solidFill>
@@ -5861,7 +5928,7 @@
               <a:t>James </a:t>
             </a:r>
             <a:r>
-              <a:rPr lang="en-US" sz="5400" b="0" strike="noStrike" spc="-1" dirty="0" err="1">
+              <a:rPr lang="en-US" sz="4400" b="0" strike="noStrike" spc="-1" dirty="0" err="1">
                 <a:solidFill>
                   <a:srgbClr val="000000"/>
                 </a:solidFill>
@@ -5876,7 +5943,7 @@
               <a:t>Erardi</a:t>
             </a:r>
             <a:r>
-              <a:rPr lang="en-US" sz="5400" b="0" strike="noStrike" spc="-1" dirty="0">
+              <a:rPr lang="en-US" sz="4400" b="0" strike="noStrike" spc="-1" dirty="0">
                 <a:solidFill>
                   <a:srgbClr val="000000"/>
                 </a:solidFill>
@@ -5888,28 +5955,10 @@
                 <a:latin typeface="Times New Roman"/>
                 <a:ea typeface="Times New Roman"/>
               </a:rPr>
-              <a:t> : Database/Server</a:t>
+              <a:t> </a:t>
             </a:r>
-            <a:endParaRPr lang="en-US" sz="2800" b="0" strike="noStrike" spc="-1" dirty="0">
-              <a:solidFill>
-                <a:srgbClr val="000000"/>
-              </a:solidFill>
-              <a:uFill>
-                <a:solidFill>
-                  <a:srgbClr val="FFFFFF"/>
-                </a:solidFill>
-              </a:uFill>
-              <a:latin typeface="Calibri"/>
-            </a:endParaRPr>
-          </a:p>
-          <a:p>
-            <a:pPr>
-              <a:lnSpc>
-                <a:spcPct val="100000"/>
-              </a:lnSpc>
-            </a:pPr>
             <a:r>
-              <a:rPr lang="en-US" sz="5400" b="0" strike="noStrike" spc="-1" dirty="0">
+              <a:rPr lang="en-US" sz="4400" b="0" strike="noStrike" spc="-1" dirty="0" smtClean="0">
                 <a:solidFill>
                   <a:srgbClr val="000000"/>
                 </a:solidFill>
@@ -5921,10 +5970,35 @@
                 <a:latin typeface="Times New Roman"/>
                 <a:ea typeface="Times New Roman"/>
               </a:rPr>
-              <a:t>TJ Tracy : Client/</a:t>
+              <a:t>: finishing Server side CRUD</a:t>
             </a:r>
+          </a:p>
+          <a:p>
+            <a:pPr>
+              <a:lnSpc>
+                <a:spcPct val="100000"/>
+              </a:lnSpc>
+            </a:pPr>
+            <a:endParaRPr lang="en-US" sz="2000" b="0" strike="noStrike" spc="-1" dirty="0">
+              <a:solidFill>
+                <a:srgbClr val="000000"/>
+              </a:solidFill>
+              <a:uFill>
+                <a:solidFill>
+                  <a:srgbClr val="FFFFFF"/>
+                </a:solidFill>
+              </a:uFill>
+              <a:latin typeface="Calibri"/>
+            </a:endParaRPr>
+          </a:p>
+          <a:p>
+            <a:pPr>
+              <a:lnSpc>
+                <a:spcPct val="100000"/>
+              </a:lnSpc>
+            </a:pPr>
             <a:r>
-              <a:rPr lang="en-US" sz="5400" b="0" strike="noStrike" spc="-1" dirty="0" err="1">
+              <a:rPr lang="en-US" sz="4400" b="0" strike="noStrike" spc="-1" dirty="0">
                 <a:solidFill>
                   <a:srgbClr val="000000"/>
                 </a:solidFill>
@@ -5936,10 +6010,10 @@
                 <a:latin typeface="Times New Roman"/>
                 <a:ea typeface="Times New Roman"/>
               </a:rPr>
-              <a:t>api</a:t>
+              <a:t>TJ Tracy : </a:t>
             </a:r>
             <a:r>
-              <a:rPr lang="en-US" sz="5400" b="0" strike="noStrike" spc="-1" dirty="0">
+              <a:rPr lang="en-US" sz="4400" spc="-1" dirty="0" smtClean="0">
                 <a:solidFill>
                   <a:srgbClr val="000000"/>
                 </a:solidFill>
@@ -5951,9 +6025,16 @@
                 <a:latin typeface="Times New Roman"/>
                 <a:ea typeface="Times New Roman"/>
               </a:rPr>
-              <a:t> requests </a:t>
+              <a:t>Finishing Client side CRUD</a:t>
             </a:r>
-            <a:endParaRPr lang="en-US" sz="2800" b="0" strike="noStrike" spc="-1" dirty="0">
+          </a:p>
+          <a:p>
+            <a:pPr>
+              <a:lnSpc>
+                <a:spcPct val="100000"/>
+              </a:lnSpc>
+            </a:pPr>
+            <a:endParaRPr lang="en-US" sz="2000" b="0" strike="noStrike" spc="-1" dirty="0">
               <a:solidFill>
                 <a:srgbClr val="000000"/>
               </a:solidFill>
@@ -5972,7 +6053,7 @@
               </a:lnSpc>
             </a:pPr>
             <a:r>
-              <a:rPr lang="en-US" sz="5400" b="0" strike="noStrike" spc="-1" dirty="0" err="1">
+              <a:rPr lang="en-US" sz="4400" b="0" strike="noStrike" spc="-1" dirty="0" err="1">
                 <a:solidFill>
                   <a:srgbClr val="000000"/>
                 </a:solidFill>
@@ -5987,7 +6068,7 @@
               <a:t>Leangseu</a:t>
             </a:r>
             <a:r>
-              <a:rPr lang="en-US" sz="5400" b="0" strike="noStrike" spc="-1" dirty="0">
+              <a:rPr lang="en-US" sz="4400" b="0" strike="noStrike" spc="-1" dirty="0">
                 <a:solidFill>
                   <a:srgbClr val="000000"/>
                 </a:solidFill>
@@ -6001,7 +6082,7 @@
               </a:rPr>
               <a:t> Kim: Update UI</a:t>
             </a:r>
-            <a:endParaRPr lang="en-US" sz="2800" b="0" strike="noStrike" spc="-1" dirty="0">
+            <a:endParaRPr lang="en-US" sz="2000" b="0" strike="noStrike" spc="-1" dirty="0">
               <a:solidFill>
                 <a:srgbClr val="000000"/>
               </a:solidFill>
@@ -6179,10 +6260,10 @@
                 <a:latin typeface="Times New Roman"/>
                 <a:ea typeface="Times New Roman"/>
               </a:rPr>
-              <a:t>Creating make local database synch </a:t>
+              <a:t>Local database syncing with </a:t>
             </a:r>
             <a:r>
-              <a:rPr lang="en-US" sz="5400" spc="-1" smtClean="0">
+              <a:rPr lang="en-US" sz="5400" spc="-1" dirty="0" smtClean="0">
                 <a:solidFill>
                   <a:srgbClr val="000000"/>
                 </a:solidFill>
@@ -6194,7 +6275,58 @@
                 <a:latin typeface="Times New Roman"/>
                 <a:ea typeface="Times New Roman"/>
               </a:rPr>
-              <a:t>with cloud database</a:t>
+              <a:t>cloud </a:t>
+            </a:r>
+            <a:r>
+              <a:rPr lang="en-US" sz="5400" spc="-1" dirty="0" smtClean="0">
+                <a:solidFill>
+                  <a:srgbClr val="000000"/>
+                </a:solidFill>
+                <a:uFill>
+                  <a:solidFill>
+                    <a:srgbClr val="FFFFFF"/>
+                  </a:solidFill>
+                </a:uFill>
+                <a:latin typeface="Times New Roman"/>
+                <a:ea typeface="Times New Roman"/>
+              </a:rPr>
+              <a:t>database</a:t>
+            </a:r>
+          </a:p>
+          <a:p>
+            <a:pPr marL="457560" marR="0" lvl="0" indent="-457200" defTabSz="914400" eaLnBrk="1" fontAlgn="auto" latinLnBrk="0" hangingPunct="1">
+              <a:lnSpc>
+                <a:spcPct val="100000"/>
+              </a:lnSpc>
+              <a:spcBef>
+                <a:spcPts val="0"/>
+              </a:spcBef>
+              <a:spcAft>
+                <a:spcPts val="0"/>
+              </a:spcAft>
+              <a:buClr>
+                <a:srgbClr val="000000"/>
+              </a:buClr>
+              <a:buSzTx/>
+              <a:buFont typeface="Arial" charset="0"/>
+              <a:buChar char="•"/>
+              <a:tabLst/>
+              <a:defRPr/>
+            </a:pPr>
+            <a:r>
+              <a:rPr lang="en-US" sz="5400" spc="-1" dirty="0" smtClean="0">
+                <a:solidFill>
+                  <a:srgbClr val="000000"/>
+                </a:solidFill>
+                <a:uFill>
+                  <a:solidFill>
+                    <a:srgbClr val="FFFFFF"/>
+                  </a:solidFill>
+                </a:uFill>
+                <a:latin typeface="Times New Roman"/>
+                <a:ea typeface="Times New Roman"/>
+              </a:rPr>
+              <a:t>Accidentally dropped database :0</a:t>
             </a:r>
             <a:endParaRPr lang="en-US" sz="5400" spc="-1" dirty="0" smtClean="0">
               <a:solidFill>

</xml_diff>